<commit_message>
Added the REST API primer page
</commit_message>
<xml_diff>
--- a/2020-01-30 - MTX Portland - REST APIs/MTX Portland - REST APIs.pptx
+++ b/2020-01-30 - MTX Portland - REST APIs/MTX Portland - REST APIs.pptx
@@ -11,6 +11,7 @@
     <p:sldId id="258" r:id="rId5"/>
     <p:sldId id="259" r:id="rId6"/>
     <p:sldId id="260" r:id="rId7"/>
+    <p:sldId id="267" r:id="rId8"/>
   </p:sldIdLst>
   <p:sldSz cx="12192000" cy="6858000"/>
   <p:notesSz cx="6858000" cy="9144000"/>
@@ -264,7 +265,7 @@
           <a:p>
             <a:fld id="{D46B952B-F692-4DD1-9678-FCDA40C3FC40}" type="datetimeFigureOut">
               <a:rPr lang="en-US" smtClean="0"/>
-              <a:t>1/3/2020</a:t>
+              <a:t>1/20/2020</a:t>
             </a:fld>
             <a:endParaRPr lang="en-US"/>
           </a:p>
@@ -462,7 +463,7 @@
           <a:p>
             <a:fld id="{D46B952B-F692-4DD1-9678-FCDA40C3FC40}" type="datetimeFigureOut">
               <a:rPr lang="en-US" smtClean="0"/>
-              <a:t>1/3/2020</a:t>
+              <a:t>1/20/2020</a:t>
             </a:fld>
             <a:endParaRPr lang="en-US"/>
           </a:p>
@@ -670,7 +671,7 @@
           <a:p>
             <a:fld id="{D46B952B-F692-4DD1-9678-FCDA40C3FC40}" type="datetimeFigureOut">
               <a:rPr lang="en-US" smtClean="0"/>
-              <a:t>1/3/2020</a:t>
+              <a:t>1/20/2020</a:t>
             </a:fld>
             <a:endParaRPr lang="en-US"/>
           </a:p>
@@ -868,7 +869,7 @@
           <a:p>
             <a:fld id="{D46B952B-F692-4DD1-9678-FCDA40C3FC40}" type="datetimeFigureOut">
               <a:rPr lang="en-US" smtClean="0"/>
-              <a:t>1/3/2020</a:t>
+              <a:t>1/20/2020</a:t>
             </a:fld>
             <a:endParaRPr lang="en-US"/>
           </a:p>
@@ -1143,7 +1144,7 @@
           <a:p>
             <a:fld id="{D46B952B-F692-4DD1-9678-FCDA40C3FC40}" type="datetimeFigureOut">
               <a:rPr lang="en-US" smtClean="0"/>
-              <a:t>1/3/2020</a:t>
+              <a:t>1/20/2020</a:t>
             </a:fld>
             <a:endParaRPr lang="en-US"/>
           </a:p>
@@ -1408,7 +1409,7 @@
           <a:p>
             <a:fld id="{D46B952B-F692-4DD1-9678-FCDA40C3FC40}" type="datetimeFigureOut">
               <a:rPr lang="en-US" smtClean="0"/>
-              <a:t>1/3/2020</a:t>
+              <a:t>1/20/2020</a:t>
             </a:fld>
             <a:endParaRPr lang="en-US"/>
           </a:p>
@@ -1820,7 +1821,7 @@
           <a:p>
             <a:fld id="{D46B952B-F692-4DD1-9678-FCDA40C3FC40}" type="datetimeFigureOut">
               <a:rPr lang="en-US" smtClean="0"/>
-              <a:t>1/3/2020</a:t>
+              <a:t>1/20/2020</a:t>
             </a:fld>
             <a:endParaRPr lang="en-US"/>
           </a:p>
@@ -1961,7 +1962,7 @@
           <a:p>
             <a:fld id="{D46B952B-F692-4DD1-9678-FCDA40C3FC40}" type="datetimeFigureOut">
               <a:rPr lang="en-US" smtClean="0"/>
-              <a:t>1/3/2020</a:t>
+              <a:t>1/20/2020</a:t>
             </a:fld>
             <a:endParaRPr lang="en-US"/>
           </a:p>
@@ -2074,7 +2075,7 @@
           <a:p>
             <a:fld id="{D46B952B-F692-4DD1-9678-FCDA40C3FC40}" type="datetimeFigureOut">
               <a:rPr lang="en-US" smtClean="0"/>
-              <a:t>1/3/2020</a:t>
+              <a:t>1/20/2020</a:t>
             </a:fld>
             <a:endParaRPr lang="en-US"/>
           </a:p>
@@ -2385,7 +2386,7 @@
           <a:p>
             <a:fld id="{D46B952B-F692-4DD1-9678-FCDA40C3FC40}" type="datetimeFigureOut">
               <a:rPr lang="en-US" smtClean="0"/>
-              <a:t>1/3/2020</a:t>
+              <a:t>1/20/2020</a:t>
             </a:fld>
             <a:endParaRPr lang="en-US"/>
           </a:p>
@@ -2673,7 +2674,7 @@
           <a:p>
             <a:fld id="{D46B952B-F692-4DD1-9678-FCDA40C3FC40}" type="datetimeFigureOut">
               <a:rPr lang="en-US" smtClean="0"/>
-              <a:t>1/3/2020</a:t>
+              <a:t>1/20/2020</a:t>
             </a:fld>
             <a:endParaRPr lang="en-US"/>
           </a:p>
@@ -2923,7 +2924,7 @@
           <a:p>
             <a:fld id="{D46B952B-F692-4DD1-9678-FCDA40C3FC40}" type="datetimeFigureOut">
               <a:rPr lang="en-US" smtClean="0"/>
-              <a:t>1/3/2020</a:t>
+              <a:t>1/20/2020</a:t>
             </a:fld>
             <a:endParaRPr lang="en-US"/>
           </a:p>
@@ -5034,6 +5035,148 @@
 </p:sld>
 </file>
 
+<file path=ppt/slides/slide7.xml><?xml version="1.0" encoding="utf-8"?>
+<p:sld xmlns:a="http://schemas.openxmlformats.org/drawingml/2006/main" xmlns:r="http://schemas.openxmlformats.org/officeDocument/2006/relationships" xmlns:p="http://schemas.openxmlformats.org/presentationml/2006/main">
+  <p:cSld>
+    <p:spTree>
+      <p:nvGrpSpPr>
+        <p:cNvPr id="1" name=""/>
+        <p:cNvGrpSpPr/>
+        <p:nvPr/>
+      </p:nvGrpSpPr>
+      <p:grpSpPr>
+        <a:xfrm>
+          <a:off x="0" y="0"/>
+          <a:ext cx="0" cy="0"/>
+          <a:chOff x="0" y="0"/>
+          <a:chExt cx="0" cy="0"/>
+        </a:xfrm>
+      </p:grpSpPr>
+      <p:sp>
+        <p:nvSpPr>
+          <p:cNvPr id="2" name="Title 1">
+            <a:extLst>
+              <a:ext uri="{FF2B5EF4-FFF2-40B4-BE49-F238E27FC236}">
+                <a16:creationId xmlns:a16="http://schemas.microsoft.com/office/drawing/2014/main" id="{BD45AC98-C2AA-4FB9-899A-3831BA3822D6}"/>
+              </a:ext>
+            </a:extLst>
+          </p:cNvPr>
+          <p:cNvSpPr>
+            <a:spLocks noGrp="1"/>
+          </p:cNvSpPr>
+          <p:nvPr>
+            <p:ph type="title"/>
+          </p:nvPr>
+        </p:nvSpPr>
+        <p:spPr/>
+        <p:txBody>
+          <a:bodyPr/>
+          <a:lstStyle/>
+          <a:p>
+            <a:r>
+              <a:rPr lang="en-US" dirty="0"/>
+              <a:t>Brief REST </a:t>
+            </a:r>
+            <a:r>
+              <a:rPr lang="en-US"/>
+              <a:t>API request primer</a:t>
+            </a:r>
+            <a:endParaRPr lang="en-US" dirty="0"/>
+          </a:p>
+        </p:txBody>
+      </p:sp>
+      <p:sp>
+        <p:nvSpPr>
+          <p:cNvPr id="3" name="Content Placeholder 2">
+            <a:extLst>
+              <a:ext uri="{FF2B5EF4-FFF2-40B4-BE49-F238E27FC236}">
+                <a16:creationId xmlns:a16="http://schemas.microsoft.com/office/drawing/2014/main" id="{020E3B8E-F9C9-4057-8B5D-31CAFD753D21}"/>
+              </a:ext>
+            </a:extLst>
+          </p:cNvPr>
+          <p:cNvSpPr>
+            <a:spLocks noGrp="1"/>
+          </p:cNvSpPr>
+          <p:nvPr>
+            <p:ph idx="1"/>
+          </p:nvPr>
+        </p:nvSpPr>
+        <p:spPr/>
+        <p:txBody>
+          <a:bodyPr/>
+          <a:lstStyle/>
+          <a:p>
+            <a:r>
+              <a:rPr lang="en-US" dirty="0"/>
+              <a:t>URI</a:t>
+            </a:r>
+          </a:p>
+          <a:p>
+            <a:pPr lvl="1"/>
+            <a:r>
+              <a:rPr lang="en-US" dirty="0"/>
+              <a:t>Address of the endpoint</a:t>
+            </a:r>
+          </a:p>
+          <a:p>
+            <a:r>
+              <a:rPr lang="en-US" dirty="0"/>
+              <a:t>Method</a:t>
+            </a:r>
+          </a:p>
+          <a:p>
+            <a:pPr lvl="1"/>
+            <a:r>
+              <a:rPr lang="en-US" dirty="0"/>
+              <a:t>Get, post, patch, delete, and more</a:t>
+            </a:r>
+          </a:p>
+          <a:p>
+            <a:r>
+              <a:rPr lang="en-US" dirty="0"/>
+              <a:t>Headers</a:t>
+            </a:r>
+          </a:p>
+          <a:p>
+            <a:pPr lvl="1"/>
+            <a:r>
+              <a:rPr lang="en-US" dirty="0"/>
+              <a:t>Key-value pairs</a:t>
+            </a:r>
+          </a:p>
+          <a:p>
+            <a:r>
+              <a:rPr lang="en-US" dirty="0"/>
+              <a:t>Body</a:t>
+            </a:r>
+          </a:p>
+          <a:p>
+            <a:pPr lvl="1"/>
+            <a:r>
+              <a:rPr lang="en-US" dirty="0"/>
+              <a:t>Data in a variety of possible formats (json, xml, form, </a:t>
+            </a:r>
+            <a:r>
+              <a:rPr lang="en-US" dirty="0" err="1"/>
+              <a:t>etc</a:t>
+            </a:r>
+            <a:endParaRPr lang="en-US" dirty="0"/>
+          </a:p>
+        </p:txBody>
+      </p:sp>
+    </p:spTree>
+    <p:extLst>
+      <p:ext uri="{BB962C8B-B14F-4D97-AF65-F5344CB8AC3E}">
+        <p14:creationId xmlns:p14="http://schemas.microsoft.com/office/powerpoint/2010/main" val="3171487894"/>
+      </p:ext>
+    </p:extLst>
+  </p:cSld>
+  <p:clrMapOvr>
+    <a:masterClrMapping/>
+  </p:clrMapOvr>
+</p:sld>
+</file>
+
 <file path=ppt/theme/theme1.xml><?xml version="1.0" encoding="utf-8"?>
 <a:theme xmlns:a="http://schemas.openxmlformats.org/drawingml/2006/main" name="Office Theme">
   <a:themeElements>

</xml_diff>

<commit_message>
added a demo environment slide
</commit_message>
<xml_diff>
--- a/2020-01-30 - MTX Portland - REST APIs/MTX Portland - REST APIs.pptx
+++ b/2020-01-30 - MTX Portland - REST APIs/MTX Portland - REST APIs.pptx
@@ -11,7 +11,8 @@
     <p:sldId id="258" r:id="rId5"/>
     <p:sldId id="259" r:id="rId6"/>
     <p:sldId id="260" r:id="rId7"/>
-    <p:sldId id="267" r:id="rId8"/>
+    <p:sldId id="268" r:id="rId8"/>
+    <p:sldId id="267" r:id="rId9"/>
   </p:sldIdLst>
   <p:sldSz cx="12192000" cy="6858000"/>
   <p:notesSz cx="6858000" cy="9144000"/>
@@ -265,7 +266,7 @@
           <a:p>
             <a:fld id="{D46B952B-F692-4DD1-9678-FCDA40C3FC40}" type="datetimeFigureOut">
               <a:rPr lang="en-US" smtClean="0"/>
-              <a:t>1/20/2020</a:t>
+              <a:t>1/24/2020</a:t>
             </a:fld>
             <a:endParaRPr lang="en-US"/>
           </a:p>
@@ -463,7 +464,7 @@
           <a:p>
             <a:fld id="{D46B952B-F692-4DD1-9678-FCDA40C3FC40}" type="datetimeFigureOut">
               <a:rPr lang="en-US" smtClean="0"/>
-              <a:t>1/20/2020</a:t>
+              <a:t>1/24/2020</a:t>
             </a:fld>
             <a:endParaRPr lang="en-US"/>
           </a:p>
@@ -671,7 +672,7 @@
           <a:p>
             <a:fld id="{D46B952B-F692-4DD1-9678-FCDA40C3FC40}" type="datetimeFigureOut">
               <a:rPr lang="en-US" smtClean="0"/>
-              <a:t>1/20/2020</a:t>
+              <a:t>1/24/2020</a:t>
             </a:fld>
             <a:endParaRPr lang="en-US"/>
           </a:p>
@@ -869,7 +870,7 @@
           <a:p>
             <a:fld id="{D46B952B-F692-4DD1-9678-FCDA40C3FC40}" type="datetimeFigureOut">
               <a:rPr lang="en-US" smtClean="0"/>
-              <a:t>1/20/2020</a:t>
+              <a:t>1/24/2020</a:t>
             </a:fld>
             <a:endParaRPr lang="en-US"/>
           </a:p>
@@ -1144,7 +1145,7 @@
           <a:p>
             <a:fld id="{D46B952B-F692-4DD1-9678-FCDA40C3FC40}" type="datetimeFigureOut">
               <a:rPr lang="en-US" smtClean="0"/>
-              <a:t>1/20/2020</a:t>
+              <a:t>1/24/2020</a:t>
             </a:fld>
             <a:endParaRPr lang="en-US"/>
           </a:p>
@@ -1409,7 +1410,7 @@
           <a:p>
             <a:fld id="{D46B952B-F692-4DD1-9678-FCDA40C3FC40}" type="datetimeFigureOut">
               <a:rPr lang="en-US" smtClean="0"/>
-              <a:t>1/20/2020</a:t>
+              <a:t>1/24/2020</a:t>
             </a:fld>
             <a:endParaRPr lang="en-US"/>
           </a:p>
@@ -1821,7 +1822,7 @@
           <a:p>
             <a:fld id="{D46B952B-F692-4DD1-9678-FCDA40C3FC40}" type="datetimeFigureOut">
               <a:rPr lang="en-US" smtClean="0"/>
-              <a:t>1/20/2020</a:t>
+              <a:t>1/24/2020</a:t>
             </a:fld>
             <a:endParaRPr lang="en-US"/>
           </a:p>
@@ -1962,7 +1963,7 @@
           <a:p>
             <a:fld id="{D46B952B-F692-4DD1-9678-FCDA40C3FC40}" type="datetimeFigureOut">
               <a:rPr lang="en-US" smtClean="0"/>
-              <a:t>1/20/2020</a:t>
+              <a:t>1/24/2020</a:t>
             </a:fld>
             <a:endParaRPr lang="en-US"/>
           </a:p>
@@ -2075,7 +2076,7 @@
           <a:p>
             <a:fld id="{D46B952B-F692-4DD1-9678-FCDA40C3FC40}" type="datetimeFigureOut">
               <a:rPr lang="en-US" smtClean="0"/>
-              <a:t>1/20/2020</a:t>
+              <a:t>1/24/2020</a:t>
             </a:fld>
             <a:endParaRPr lang="en-US"/>
           </a:p>
@@ -2386,7 +2387,7 @@
           <a:p>
             <a:fld id="{D46B952B-F692-4DD1-9678-FCDA40C3FC40}" type="datetimeFigureOut">
               <a:rPr lang="en-US" smtClean="0"/>
-              <a:t>1/20/2020</a:t>
+              <a:t>1/24/2020</a:t>
             </a:fld>
             <a:endParaRPr lang="en-US"/>
           </a:p>
@@ -2674,7 +2675,7 @@
           <a:p>
             <a:fld id="{D46B952B-F692-4DD1-9678-FCDA40C3FC40}" type="datetimeFigureOut">
               <a:rPr lang="en-US" smtClean="0"/>
-              <a:t>1/20/2020</a:t>
+              <a:t>1/24/2020</a:t>
             </a:fld>
             <a:endParaRPr lang="en-US"/>
           </a:p>
@@ -2924,7 +2925,7 @@
           <a:p>
             <a:fld id="{D46B952B-F692-4DD1-9678-FCDA40C3FC40}" type="datetimeFigureOut">
               <a:rPr lang="en-US" smtClean="0"/>
-              <a:t>1/20/2020</a:t>
+              <a:t>1/24/2020</a:t>
             </a:fld>
             <a:endParaRPr lang="en-US"/>
           </a:p>
@@ -5057,6 +5058,123 @@
           <p:cNvPr id="2" name="Title 1">
             <a:extLst>
               <a:ext uri="{FF2B5EF4-FFF2-40B4-BE49-F238E27FC236}">
+                <a16:creationId xmlns:a16="http://schemas.microsoft.com/office/drawing/2014/main" id="{F1661924-E51B-4AA1-A1C5-C9AD9EE32D81}"/>
+              </a:ext>
+            </a:extLst>
+          </p:cNvPr>
+          <p:cNvSpPr>
+            <a:spLocks noGrp="1"/>
+          </p:cNvSpPr>
+          <p:nvPr>
+            <p:ph type="title"/>
+          </p:nvPr>
+        </p:nvSpPr>
+        <p:spPr/>
+        <p:txBody>
+          <a:bodyPr/>
+          <a:lstStyle/>
+          <a:p>
+            <a:r>
+              <a:rPr lang="en-US" dirty="0"/>
+              <a:t>Demo Environment</a:t>
+            </a:r>
+          </a:p>
+        </p:txBody>
+      </p:sp>
+      <p:sp>
+        <p:nvSpPr>
+          <p:cNvPr id="3" name="Content Placeholder 2">
+            <a:extLst>
+              <a:ext uri="{FF2B5EF4-FFF2-40B4-BE49-F238E27FC236}">
+                <a16:creationId xmlns:a16="http://schemas.microsoft.com/office/drawing/2014/main" id="{4FA49B7C-A4DE-4ADA-8216-70A81166A541}"/>
+              </a:ext>
+            </a:extLst>
+          </p:cNvPr>
+          <p:cNvSpPr>
+            <a:spLocks noGrp="1"/>
+          </p:cNvSpPr>
+          <p:nvPr>
+            <p:ph idx="1"/>
+          </p:nvPr>
+        </p:nvSpPr>
+        <p:spPr/>
+        <p:txBody>
+          <a:bodyPr/>
+          <a:lstStyle/>
+          <a:p>
+            <a:r>
+              <a:rPr lang="en-US" dirty="0"/>
+              <a:t>Windows 10</a:t>
+            </a:r>
+          </a:p>
+          <a:p>
+            <a:r>
+              <a:rPr lang="en-US" dirty="0"/>
+              <a:t>PowerShell 5.1</a:t>
+            </a:r>
+          </a:p>
+          <a:p>
+            <a:r>
+              <a:rPr lang="en-US" dirty="0"/>
+              <a:t>PowerShell 6.2.3</a:t>
+            </a:r>
+          </a:p>
+          <a:p>
+            <a:r>
+              <a:rPr lang="en-US" dirty="0"/>
+              <a:t>Octopus Deploy (latest version)</a:t>
+            </a:r>
+          </a:p>
+          <a:p>
+            <a:r>
+              <a:rPr lang="en-US" dirty="0"/>
+              <a:t>Airtable</a:t>
+            </a:r>
+          </a:p>
+          <a:p>
+            <a:r>
+              <a:rPr lang="en-US"/>
+              <a:t>Azure DevOps</a:t>
+            </a:r>
+            <a:endParaRPr lang="en-US" dirty="0"/>
+          </a:p>
+        </p:txBody>
+      </p:sp>
+    </p:spTree>
+    <p:extLst>
+      <p:ext uri="{BB962C8B-B14F-4D97-AF65-F5344CB8AC3E}">
+        <p14:creationId xmlns:p14="http://schemas.microsoft.com/office/powerpoint/2010/main" val="3298450064"/>
+      </p:ext>
+    </p:extLst>
+  </p:cSld>
+  <p:clrMapOvr>
+    <a:masterClrMapping/>
+  </p:clrMapOvr>
+</p:sld>
+</file>
+
+<file path=ppt/slides/slide8.xml><?xml version="1.0" encoding="utf-8"?>
+<p:sld xmlns:a="http://schemas.openxmlformats.org/drawingml/2006/main" xmlns:r="http://schemas.openxmlformats.org/officeDocument/2006/relationships" xmlns:p="http://schemas.openxmlformats.org/presentationml/2006/main">
+  <p:cSld>
+    <p:spTree>
+      <p:nvGrpSpPr>
+        <p:cNvPr id="1" name=""/>
+        <p:cNvGrpSpPr/>
+        <p:nvPr/>
+      </p:nvGrpSpPr>
+      <p:grpSpPr>
+        <a:xfrm>
+          <a:off x="0" y="0"/>
+          <a:ext cx="0" cy="0"/>
+          <a:chOff x="0" y="0"/>
+          <a:chExt cx="0" cy="0"/>
+        </a:xfrm>
+      </p:grpSpPr>
+      <p:sp>
+        <p:nvSpPr>
+          <p:cNvPr id="2" name="Title 1">
+            <a:extLst>
+              <a:ext uri="{FF2B5EF4-FFF2-40B4-BE49-F238E27FC236}">
                 <a16:creationId xmlns:a16="http://schemas.microsoft.com/office/drawing/2014/main" id="{BD45AC98-C2AA-4FB9-899A-3831BA3822D6}"/>
               </a:ext>
             </a:extLst>

</xml_diff>

<commit_message>
update after practice run
</commit_message>
<xml_diff>
--- a/2020-01-30 - MTX Portland - REST APIs/MTX Portland - REST APIs.pptx
+++ b/2020-01-30 - MTX Portland - REST APIs/MTX Portland - REST APIs.pptx
@@ -266,7 +266,7 @@
           <a:p>
             <a:fld id="{D46B952B-F692-4DD1-9678-FCDA40C3FC40}" type="datetimeFigureOut">
               <a:rPr lang="en-US" smtClean="0"/>
-              <a:t>1/24/2020</a:t>
+              <a:t>1/26/2020</a:t>
             </a:fld>
             <a:endParaRPr lang="en-US"/>
           </a:p>
@@ -464,7 +464,7 @@
           <a:p>
             <a:fld id="{D46B952B-F692-4DD1-9678-FCDA40C3FC40}" type="datetimeFigureOut">
               <a:rPr lang="en-US" smtClean="0"/>
-              <a:t>1/24/2020</a:t>
+              <a:t>1/26/2020</a:t>
             </a:fld>
             <a:endParaRPr lang="en-US"/>
           </a:p>
@@ -672,7 +672,7 @@
           <a:p>
             <a:fld id="{D46B952B-F692-4DD1-9678-FCDA40C3FC40}" type="datetimeFigureOut">
               <a:rPr lang="en-US" smtClean="0"/>
-              <a:t>1/24/2020</a:t>
+              <a:t>1/26/2020</a:t>
             </a:fld>
             <a:endParaRPr lang="en-US"/>
           </a:p>
@@ -870,7 +870,7 @@
           <a:p>
             <a:fld id="{D46B952B-F692-4DD1-9678-FCDA40C3FC40}" type="datetimeFigureOut">
               <a:rPr lang="en-US" smtClean="0"/>
-              <a:t>1/24/2020</a:t>
+              <a:t>1/26/2020</a:t>
             </a:fld>
             <a:endParaRPr lang="en-US"/>
           </a:p>
@@ -1145,7 +1145,7 @@
           <a:p>
             <a:fld id="{D46B952B-F692-4DD1-9678-FCDA40C3FC40}" type="datetimeFigureOut">
               <a:rPr lang="en-US" smtClean="0"/>
-              <a:t>1/24/2020</a:t>
+              <a:t>1/26/2020</a:t>
             </a:fld>
             <a:endParaRPr lang="en-US"/>
           </a:p>
@@ -1410,7 +1410,7 @@
           <a:p>
             <a:fld id="{D46B952B-F692-4DD1-9678-FCDA40C3FC40}" type="datetimeFigureOut">
               <a:rPr lang="en-US" smtClean="0"/>
-              <a:t>1/24/2020</a:t>
+              <a:t>1/26/2020</a:t>
             </a:fld>
             <a:endParaRPr lang="en-US"/>
           </a:p>
@@ -1822,7 +1822,7 @@
           <a:p>
             <a:fld id="{D46B952B-F692-4DD1-9678-FCDA40C3FC40}" type="datetimeFigureOut">
               <a:rPr lang="en-US" smtClean="0"/>
-              <a:t>1/24/2020</a:t>
+              <a:t>1/26/2020</a:t>
             </a:fld>
             <a:endParaRPr lang="en-US"/>
           </a:p>
@@ -1963,7 +1963,7 @@
           <a:p>
             <a:fld id="{D46B952B-F692-4DD1-9678-FCDA40C3FC40}" type="datetimeFigureOut">
               <a:rPr lang="en-US" smtClean="0"/>
-              <a:t>1/24/2020</a:t>
+              <a:t>1/26/2020</a:t>
             </a:fld>
             <a:endParaRPr lang="en-US"/>
           </a:p>
@@ -2076,7 +2076,7 @@
           <a:p>
             <a:fld id="{D46B952B-F692-4DD1-9678-FCDA40C3FC40}" type="datetimeFigureOut">
               <a:rPr lang="en-US" smtClean="0"/>
-              <a:t>1/24/2020</a:t>
+              <a:t>1/26/2020</a:t>
             </a:fld>
             <a:endParaRPr lang="en-US"/>
           </a:p>
@@ -2387,7 +2387,7 @@
           <a:p>
             <a:fld id="{D46B952B-F692-4DD1-9678-FCDA40C3FC40}" type="datetimeFigureOut">
               <a:rPr lang="en-US" smtClean="0"/>
-              <a:t>1/24/2020</a:t>
+              <a:t>1/26/2020</a:t>
             </a:fld>
             <a:endParaRPr lang="en-US"/>
           </a:p>
@@ -2675,7 +2675,7 @@
           <a:p>
             <a:fld id="{D46B952B-F692-4DD1-9678-FCDA40C3FC40}" type="datetimeFigureOut">
               <a:rPr lang="en-US" smtClean="0"/>
-              <a:t>1/24/2020</a:t>
+              <a:t>1/26/2020</a:t>
             </a:fld>
             <a:endParaRPr lang="en-US"/>
           </a:p>
@@ -2925,7 +2925,7 @@
           <a:p>
             <a:fld id="{D46B952B-F692-4DD1-9678-FCDA40C3FC40}" type="datetimeFigureOut">
               <a:rPr lang="en-US" smtClean="0"/>
-              <a:t>1/24/2020</a:t>
+              <a:t>1/26/2020</a:t>
             </a:fld>
             <a:endParaRPr lang="en-US"/>
           </a:p>
@@ -4244,6 +4244,12 @@
           <a:p>
             <a:r>
               <a:rPr lang="en-US" dirty="0"/>
+              <a:t>Working with JSON</a:t>
+            </a:r>
+          </a:p>
+          <a:p>
+            <a:r>
+              <a:rPr lang="en-US" dirty="0"/>
               <a:t>Invoke-</a:t>
             </a:r>
             <a:r>
@@ -4267,12 +4273,6 @@
             <a:r>
               <a:rPr lang="en-US" dirty="0"/>
               <a:t>)</a:t>
-            </a:r>
-          </a:p>
-          <a:p>
-            <a:r>
-              <a:rPr lang="en-US" dirty="0"/>
-              <a:t>Working with JSON</a:t>
             </a:r>
           </a:p>
           <a:p>
@@ -5133,10 +5133,15 @@
           </a:p>
           <a:p>
             <a:r>
-              <a:rPr lang="en-US"/>
+              <a:rPr lang="en-US" dirty="0"/>
               <a:t>Azure DevOps</a:t>
             </a:r>
-            <a:endParaRPr lang="en-US" dirty="0"/>
+          </a:p>
+          <a:p>
+            <a:r>
+              <a:rPr lang="en-US" dirty="0"/>
+              <a:t>Sherpa Desk</a:t>
+            </a:r>
           </a:p>
         </p:txBody>
       </p:sp>
@@ -5278,7 +5283,10 @@
               <a:rPr lang="en-US" dirty="0" err="1"/>
               <a:t>etc</a:t>
             </a:r>
-            <a:endParaRPr lang="en-US" dirty="0"/>
+            <a:r>
+              <a:rPr lang="en-US" dirty="0"/>
+              <a:t>)</a:t>
+            </a:r>
           </a:p>
         </p:txBody>
       </p:sp>
@@ -5292,6 +5300,359 @@
   <p:clrMapOvr>
     <a:masterClrMapping/>
   </p:clrMapOvr>
+  <p:timing>
+    <p:tnLst>
+      <p:par>
+        <p:cTn id="1" dur="indefinite" restart="never" nodeType="tmRoot">
+          <p:childTnLst>
+            <p:seq concurrent="1" nextAc="seek">
+              <p:cTn id="2" dur="indefinite" nodeType="mainSeq">
+                <p:childTnLst>
+                  <p:par>
+                    <p:cTn id="3" fill="hold">
+                      <p:stCondLst>
+                        <p:cond delay="indefinite"/>
+                      </p:stCondLst>
+                      <p:childTnLst>
+                        <p:par>
+                          <p:cTn id="4" fill="hold">
+                            <p:stCondLst>
+                              <p:cond delay="0"/>
+                            </p:stCondLst>
+                            <p:childTnLst>
+                              <p:par>
+                                <p:cTn id="5" presetID="1" presetClass="entr" presetSubtype="0" fill="hold" grpId="0" nodeType="clickEffect">
+                                  <p:stCondLst>
+                                    <p:cond delay="0"/>
+                                  </p:stCondLst>
+                                  <p:childTnLst>
+                                    <p:set>
+                                      <p:cBhvr>
+                                        <p:cTn id="6" dur="1" fill="hold">
+                                          <p:stCondLst>
+                                            <p:cond delay="0"/>
+                                          </p:stCondLst>
+                                        </p:cTn>
+                                        <p:tgtEl>
+                                          <p:spTgt spid="3">
+                                            <p:txEl>
+                                              <p:pRg st="0" end="0"/>
+                                            </p:txEl>
+                                          </p:spTgt>
+                                        </p:tgtEl>
+                                        <p:attrNameLst>
+                                          <p:attrName>style.visibility</p:attrName>
+                                        </p:attrNameLst>
+                                      </p:cBhvr>
+                                      <p:to>
+                                        <p:strVal val="visible"/>
+                                      </p:to>
+                                    </p:set>
+                                  </p:childTnLst>
+                                </p:cTn>
+                              </p:par>
+                              <p:par>
+                                <p:cTn id="7" presetID="1" presetClass="entr" presetSubtype="0" fill="hold" grpId="0" nodeType="withEffect">
+                                  <p:stCondLst>
+                                    <p:cond delay="0"/>
+                                  </p:stCondLst>
+                                  <p:childTnLst>
+                                    <p:set>
+                                      <p:cBhvr>
+                                        <p:cTn id="8" dur="1" fill="hold">
+                                          <p:stCondLst>
+                                            <p:cond delay="0"/>
+                                          </p:stCondLst>
+                                        </p:cTn>
+                                        <p:tgtEl>
+                                          <p:spTgt spid="3">
+                                            <p:txEl>
+                                              <p:pRg st="1" end="1"/>
+                                            </p:txEl>
+                                          </p:spTgt>
+                                        </p:tgtEl>
+                                        <p:attrNameLst>
+                                          <p:attrName>style.visibility</p:attrName>
+                                        </p:attrNameLst>
+                                      </p:cBhvr>
+                                      <p:to>
+                                        <p:strVal val="visible"/>
+                                      </p:to>
+                                    </p:set>
+                                  </p:childTnLst>
+                                </p:cTn>
+                              </p:par>
+                            </p:childTnLst>
+                          </p:cTn>
+                        </p:par>
+                      </p:childTnLst>
+                    </p:cTn>
+                  </p:par>
+                  <p:par>
+                    <p:cTn id="9" fill="hold">
+                      <p:stCondLst>
+                        <p:cond delay="indefinite"/>
+                      </p:stCondLst>
+                      <p:childTnLst>
+                        <p:par>
+                          <p:cTn id="10" fill="hold">
+                            <p:stCondLst>
+                              <p:cond delay="0"/>
+                            </p:stCondLst>
+                            <p:childTnLst>
+                              <p:par>
+                                <p:cTn id="11" presetID="1" presetClass="entr" presetSubtype="0" fill="hold" grpId="0" nodeType="clickEffect">
+                                  <p:stCondLst>
+                                    <p:cond delay="0"/>
+                                  </p:stCondLst>
+                                  <p:childTnLst>
+                                    <p:set>
+                                      <p:cBhvr>
+                                        <p:cTn id="12" dur="1" fill="hold">
+                                          <p:stCondLst>
+                                            <p:cond delay="0"/>
+                                          </p:stCondLst>
+                                        </p:cTn>
+                                        <p:tgtEl>
+                                          <p:spTgt spid="3">
+                                            <p:txEl>
+                                              <p:pRg st="2" end="2"/>
+                                            </p:txEl>
+                                          </p:spTgt>
+                                        </p:tgtEl>
+                                        <p:attrNameLst>
+                                          <p:attrName>style.visibility</p:attrName>
+                                        </p:attrNameLst>
+                                      </p:cBhvr>
+                                      <p:to>
+                                        <p:strVal val="visible"/>
+                                      </p:to>
+                                    </p:set>
+                                  </p:childTnLst>
+                                </p:cTn>
+                              </p:par>
+                              <p:par>
+                                <p:cTn id="13" presetID="1" presetClass="entr" presetSubtype="0" fill="hold" grpId="0" nodeType="withEffect">
+                                  <p:stCondLst>
+                                    <p:cond delay="0"/>
+                                  </p:stCondLst>
+                                  <p:childTnLst>
+                                    <p:set>
+                                      <p:cBhvr>
+                                        <p:cTn id="14" dur="1" fill="hold">
+                                          <p:stCondLst>
+                                            <p:cond delay="0"/>
+                                          </p:stCondLst>
+                                        </p:cTn>
+                                        <p:tgtEl>
+                                          <p:spTgt spid="3">
+                                            <p:txEl>
+                                              <p:pRg st="3" end="3"/>
+                                            </p:txEl>
+                                          </p:spTgt>
+                                        </p:tgtEl>
+                                        <p:attrNameLst>
+                                          <p:attrName>style.visibility</p:attrName>
+                                        </p:attrNameLst>
+                                      </p:cBhvr>
+                                      <p:to>
+                                        <p:strVal val="visible"/>
+                                      </p:to>
+                                    </p:set>
+                                  </p:childTnLst>
+                                </p:cTn>
+                              </p:par>
+                            </p:childTnLst>
+                          </p:cTn>
+                        </p:par>
+                      </p:childTnLst>
+                    </p:cTn>
+                  </p:par>
+                  <p:par>
+                    <p:cTn id="15" fill="hold">
+                      <p:stCondLst>
+                        <p:cond delay="indefinite"/>
+                      </p:stCondLst>
+                      <p:childTnLst>
+                        <p:par>
+                          <p:cTn id="16" fill="hold">
+                            <p:stCondLst>
+                              <p:cond delay="0"/>
+                            </p:stCondLst>
+                            <p:childTnLst>
+                              <p:par>
+                                <p:cTn id="17" presetID="1" presetClass="entr" presetSubtype="0" fill="hold" grpId="0" nodeType="clickEffect">
+                                  <p:stCondLst>
+                                    <p:cond delay="0"/>
+                                  </p:stCondLst>
+                                  <p:childTnLst>
+                                    <p:set>
+                                      <p:cBhvr>
+                                        <p:cTn id="18" dur="1" fill="hold">
+                                          <p:stCondLst>
+                                            <p:cond delay="0"/>
+                                          </p:stCondLst>
+                                        </p:cTn>
+                                        <p:tgtEl>
+                                          <p:spTgt spid="3">
+                                            <p:txEl>
+                                              <p:pRg st="4" end="4"/>
+                                            </p:txEl>
+                                          </p:spTgt>
+                                        </p:tgtEl>
+                                        <p:attrNameLst>
+                                          <p:attrName>style.visibility</p:attrName>
+                                        </p:attrNameLst>
+                                      </p:cBhvr>
+                                      <p:to>
+                                        <p:strVal val="visible"/>
+                                      </p:to>
+                                    </p:set>
+                                  </p:childTnLst>
+                                </p:cTn>
+                              </p:par>
+                              <p:par>
+                                <p:cTn id="19" presetID="1" presetClass="entr" presetSubtype="0" fill="hold" grpId="0" nodeType="withEffect">
+                                  <p:stCondLst>
+                                    <p:cond delay="0"/>
+                                  </p:stCondLst>
+                                  <p:childTnLst>
+                                    <p:set>
+                                      <p:cBhvr>
+                                        <p:cTn id="20" dur="1" fill="hold">
+                                          <p:stCondLst>
+                                            <p:cond delay="0"/>
+                                          </p:stCondLst>
+                                        </p:cTn>
+                                        <p:tgtEl>
+                                          <p:spTgt spid="3">
+                                            <p:txEl>
+                                              <p:pRg st="5" end="5"/>
+                                            </p:txEl>
+                                          </p:spTgt>
+                                        </p:tgtEl>
+                                        <p:attrNameLst>
+                                          <p:attrName>style.visibility</p:attrName>
+                                        </p:attrNameLst>
+                                      </p:cBhvr>
+                                      <p:to>
+                                        <p:strVal val="visible"/>
+                                      </p:to>
+                                    </p:set>
+                                  </p:childTnLst>
+                                </p:cTn>
+                              </p:par>
+                            </p:childTnLst>
+                          </p:cTn>
+                        </p:par>
+                      </p:childTnLst>
+                    </p:cTn>
+                  </p:par>
+                  <p:par>
+                    <p:cTn id="21" fill="hold">
+                      <p:stCondLst>
+                        <p:cond delay="indefinite"/>
+                      </p:stCondLst>
+                      <p:childTnLst>
+                        <p:par>
+                          <p:cTn id="22" fill="hold">
+                            <p:stCondLst>
+                              <p:cond delay="0"/>
+                            </p:stCondLst>
+                            <p:childTnLst>
+                              <p:par>
+                                <p:cTn id="23" presetID="1" presetClass="entr" presetSubtype="0" fill="hold" grpId="0" nodeType="clickEffect">
+                                  <p:stCondLst>
+                                    <p:cond delay="0"/>
+                                  </p:stCondLst>
+                                  <p:childTnLst>
+                                    <p:set>
+                                      <p:cBhvr>
+                                        <p:cTn id="24" dur="1" fill="hold">
+                                          <p:stCondLst>
+                                            <p:cond delay="0"/>
+                                          </p:stCondLst>
+                                        </p:cTn>
+                                        <p:tgtEl>
+                                          <p:spTgt spid="3">
+                                            <p:txEl>
+                                              <p:pRg st="6" end="6"/>
+                                            </p:txEl>
+                                          </p:spTgt>
+                                        </p:tgtEl>
+                                        <p:attrNameLst>
+                                          <p:attrName>style.visibility</p:attrName>
+                                        </p:attrNameLst>
+                                      </p:cBhvr>
+                                      <p:to>
+                                        <p:strVal val="visible"/>
+                                      </p:to>
+                                    </p:set>
+                                  </p:childTnLst>
+                                </p:cTn>
+                              </p:par>
+                              <p:par>
+                                <p:cTn id="25" presetID="1" presetClass="entr" presetSubtype="0" fill="hold" grpId="0" nodeType="withEffect">
+                                  <p:stCondLst>
+                                    <p:cond delay="0"/>
+                                  </p:stCondLst>
+                                  <p:childTnLst>
+                                    <p:set>
+                                      <p:cBhvr>
+                                        <p:cTn id="26" dur="1" fill="hold">
+                                          <p:stCondLst>
+                                            <p:cond delay="0"/>
+                                          </p:stCondLst>
+                                        </p:cTn>
+                                        <p:tgtEl>
+                                          <p:spTgt spid="3">
+                                            <p:txEl>
+                                              <p:pRg st="7" end="7"/>
+                                            </p:txEl>
+                                          </p:spTgt>
+                                        </p:tgtEl>
+                                        <p:attrNameLst>
+                                          <p:attrName>style.visibility</p:attrName>
+                                        </p:attrNameLst>
+                                      </p:cBhvr>
+                                      <p:to>
+                                        <p:strVal val="visible"/>
+                                      </p:to>
+                                    </p:set>
+                                  </p:childTnLst>
+                                </p:cTn>
+                              </p:par>
+                            </p:childTnLst>
+                          </p:cTn>
+                        </p:par>
+                      </p:childTnLst>
+                    </p:cTn>
+                  </p:par>
+                </p:childTnLst>
+              </p:cTn>
+              <p:prevCondLst>
+                <p:cond evt="onPrev" delay="0">
+                  <p:tgtEl>
+                    <p:sldTgt/>
+                  </p:tgtEl>
+                </p:cond>
+              </p:prevCondLst>
+              <p:nextCondLst>
+                <p:cond evt="onNext" delay="0">
+                  <p:tgtEl>
+                    <p:sldTgt/>
+                  </p:tgtEl>
+                </p:cond>
+              </p:nextCondLst>
+            </p:seq>
+          </p:childTnLst>
+        </p:cTn>
+      </p:par>
+    </p:tnLst>
+    <p:bldLst>
+      <p:bldP spid="3" grpId="0" build="p"/>
+    </p:bldLst>
+  </p:timing>
 </p:sld>
 </file>
 

</xml_diff>

<commit_message>
clarified info in the demo env slide
</commit_message>
<xml_diff>
--- a/2020-01-30 - MTX Portland - REST APIs/MTX Portland - REST APIs.pptx
+++ b/2020-01-30 - MTX Portland - REST APIs/MTX Portland - REST APIs.pptx
@@ -266,7 +266,7 @@
           <a:p>
             <a:fld id="{D46B952B-F692-4DD1-9678-FCDA40C3FC40}" type="datetimeFigureOut">
               <a:rPr lang="en-US" smtClean="0"/>
-              <a:t>1/26/2020</a:t>
+              <a:t>1/29/2020</a:t>
             </a:fld>
             <a:endParaRPr lang="en-US"/>
           </a:p>
@@ -464,7 +464,7 @@
           <a:p>
             <a:fld id="{D46B952B-F692-4DD1-9678-FCDA40C3FC40}" type="datetimeFigureOut">
               <a:rPr lang="en-US" smtClean="0"/>
-              <a:t>1/26/2020</a:t>
+              <a:t>1/29/2020</a:t>
             </a:fld>
             <a:endParaRPr lang="en-US"/>
           </a:p>
@@ -672,7 +672,7 @@
           <a:p>
             <a:fld id="{D46B952B-F692-4DD1-9678-FCDA40C3FC40}" type="datetimeFigureOut">
               <a:rPr lang="en-US" smtClean="0"/>
-              <a:t>1/26/2020</a:t>
+              <a:t>1/29/2020</a:t>
             </a:fld>
             <a:endParaRPr lang="en-US"/>
           </a:p>
@@ -870,7 +870,7 @@
           <a:p>
             <a:fld id="{D46B952B-F692-4DD1-9678-FCDA40C3FC40}" type="datetimeFigureOut">
               <a:rPr lang="en-US" smtClean="0"/>
-              <a:t>1/26/2020</a:t>
+              <a:t>1/29/2020</a:t>
             </a:fld>
             <a:endParaRPr lang="en-US"/>
           </a:p>
@@ -1145,7 +1145,7 @@
           <a:p>
             <a:fld id="{D46B952B-F692-4DD1-9678-FCDA40C3FC40}" type="datetimeFigureOut">
               <a:rPr lang="en-US" smtClean="0"/>
-              <a:t>1/26/2020</a:t>
+              <a:t>1/29/2020</a:t>
             </a:fld>
             <a:endParaRPr lang="en-US"/>
           </a:p>
@@ -1410,7 +1410,7 @@
           <a:p>
             <a:fld id="{D46B952B-F692-4DD1-9678-FCDA40C3FC40}" type="datetimeFigureOut">
               <a:rPr lang="en-US" smtClean="0"/>
-              <a:t>1/26/2020</a:t>
+              <a:t>1/29/2020</a:t>
             </a:fld>
             <a:endParaRPr lang="en-US"/>
           </a:p>
@@ -1822,7 +1822,7 @@
           <a:p>
             <a:fld id="{D46B952B-F692-4DD1-9678-FCDA40C3FC40}" type="datetimeFigureOut">
               <a:rPr lang="en-US" smtClean="0"/>
-              <a:t>1/26/2020</a:t>
+              <a:t>1/29/2020</a:t>
             </a:fld>
             <a:endParaRPr lang="en-US"/>
           </a:p>
@@ -1963,7 +1963,7 @@
           <a:p>
             <a:fld id="{D46B952B-F692-4DD1-9678-FCDA40C3FC40}" type="datetimeFigureOut">
               <a:rPr lang="en-US" smtClean="0"/>
-              <a:t>1/26/2020</a:t>
+              <a:t>1/29/2020</a:t>
             </a:fld>
             <a:endParaRPr lang="en-US"/>
           </a:p>
@@ -2076,7 +2076,7 @@
           <a:p>
             <a:fld id="{D46B952B-F692-4DD1-9678-FCDA40C3FC40}" type="datetimeFigureOut">
               <a:rPr lang="en-US" smtClean="0"/>
-              <a:t>1/26/2020</a:t>
+              <a:t>1/29/2020</a:t>
             </a:fld>
             <a:endParaRPr lang="en-US"/>
           </a:p>
@@ -2387,7 +2387,7 @@
           <a:p>
             <a:fld id="{D46B952B-F692-4DD1-9678-FCDA40C3FC40}" type="datetimeFigureOut">
               <a:rPr lang="en-US" smtClean="0"/>
-              <a:t>1/26/2020</a:t>
+              <a:t>1/29/2020</a:t>
             </a:fld>
             <a:endParaRPr lang="en-US"/>
           </a:p>
@@ -2675,7 +2675,7 @@
           <a:p>
             <a:fld id="{D46B952B-F692-4DD1-9678-FCDA40C3FC40}" type="datetimeFigureOut">
               <a:rPr lang="en-US" smtClean="0"/>
-              <a:t>1/26/2020</a:t>
+              <a:t>1/29/2020</a:t>
             </a:fld>
             <a:endParaRPr lang="en-US"/>
           </a:p>
@@ -2925,7 +2925,7 @@
           <a:p>
             <a:fld id="{D46B952B-F692-4DD1-9678-FCDA40C3FC40}" type="datetimeFigureOut">
               <a:rPr lang="en-US" smtClean="0"/>
-              <a:t>1/26/2020</a:t>
+              <a:t>1/29/2020</a:t>
             </a:fld>
             <a:endParaRPr lang="en-US"/>
           </a:p>
@@ -5110,19 +5110,27 @@
           <a:p>
             <a:r>
               <a:rPr lang="en-US" dirty="0"/>
-              <a:t>PowerShell 5.1</a:t>
+              <a:t>Windows PowerShell 5.1</a:t>
             </a:r>
           </a:p>
           <a:p>
             <a:r>
               <a:rPr lang="en-US" dirty="0"/>
-              <a:t>PowerShell 6.2.3</a:t>
+              <a:t>PowerShell 6.2.4</a:t>
             </a:r>
           </a:p>
           <a:p>
             <a:r>
               <a:rPr lang="en-US" dirty="0"/>
-              <a:t>Octopus Deploy (latest version)</a:t>
+              <a:t>Octopus Deploy </a:t>
+            </a:r>
+            <a:r>
+              <a:rPr lang="en-US"/>
+              <a:t>(latest local </a:t>
+            </a:r>
+            <a:r>
+              <a:rPr lang="en-US" dirty="0"/>
+              <a:t>version)</a:t>
             </a:r>
           </a:p>
           <a:p>

</xml_diff>